<commit_message>
Add instructions for running code
</commit_message>
<xml_diff>
--- a/slides/QCE23_netsquid_exercise.pptx
+++ b/slides/QCE23_netsquid_exercise.pptx
@@ -5,15 +5,16 @@
     <p:sldMasterId id="2147483660" r:id="rId4"/>
   </p:sldMasterIdLst>
   <p:notesMasterIdLst>
-    <p:notesMasterId r:id="rId11"/>
+    <p:notesMasterId r:id="rId12"/>
   </p:notesMasterIdLst>
   <p:sldIdLst>
     <p:sldId id="258" r:id="rId5"/>
     <p:sldId id="322" r:id="rId6"/>
-    <p:sldId id="318" r:id="rId7"/>
-    <p:sldId id="321" r:id="rId8"/>
-    <p:sldId id="319" r:id="rId9"/>
-    <p:sldId id="320" r:id="rId10"/>
+    <p:sldId id="323" r:id="rId7"/>
+    <p:sldId id="318" r:id="rId8"/>
+    <p:sldId id="321" r:id="rId9"/>
+    <p:sldId id="319" r:id="rId10"/>
+    <p:sldId id="320" r:id="rId11"/>
   </p:sldIdLst>
   <p:sldSz cx="9144000" cy="5143500" type="screen16x9"/>
   <p:notesSz cx="6858000" cy="9144000"/>
@@ -123,7 +124,7 @@
 <file path=ppt/revisionInfo.xml><?xml version="1.0" encoding="utf-8"?>
 <p1510:revInfo xmlns:a="http://schemas.openxmlformats.org/drawingml/2006/main" xmlns:r="http://schemas.openxmlformats.org/officeDocument/2006/relationships" xmlns:p1510="http://schemas.microsoft.com/office/powerpoint/2015/10/main">
   <p1510:revLst>
-    <p1510:client id="{0F3C8317-08A6-4D52-AE85-974ACF5C86AA}" v="22" dt="2023-09-17T15:49:14.411"/>
+    <p1510:client id="{0F3C8317-08A6-4D52-AE85-974ACF5C86AA}" v="23" dt="2023-09-17T16:54:28.945"/>
   </p1510:revLst>
 </p1510:revInfo>
 </file>
@@ -1088,7 +1089,7 @@
   <pc:docChgLst>
     <pc:chgData name="Wojciech Kozlowski" userId="5f20cc3a-e355-4c31-b6ab-af4bc39239c6" providerId="ADAL" clId="{0F3C8317-08A6-4D52-AE85-974ACF5C86AA}"/>
     <pc:docChg chg="undo custSel addSld delSld modSld sldOrd">
-      <pc:chgData name="Wojciech Kozlowski" userId="5f20cc3a-e355-4c31-b6ab-af4bc39239c6" providerId="ADAL" clId="{0F3C8317-08A6-4D52-AE85-974ACF5C86AA}" dt="2023-09-17T15:50:01.305" v="728" actId="1076"/>
+      <pc:chgData name="Wojciech Kozlowski" userId="5f20cc3a-e355-4c31-b6ab-af4bc39239c6" providerId="ADAL" clId="{0F3C8317-08A6-4D52-AE85-974ACF5C86AA}" dt="2023-09-17T16:59:46.076" v="1021" actId="13926"/>
       <pc:docMkLst>
         <pc:docMk/>
       </pc:docMkLst>
@@ -1610,6 +1611,29 @@
           <pc:docMk/>
           <pc:sldMk cId="1842644141" sldId="322"/>
         </pc:sldMkLst>
+      </pc:sldChg>
+      <pc:sldChg chg="modSp new mod">
+        <pc:chgData name="Wojciech Kozlowski" userId="5f20cc3a-e355-4c31-b6ab-af4bc39239c6" providerId="ADAL" clId="{0F3C8317-08A6-4D52-AE85-974ACF5C86AA}" dt="2023-09-17T16:59:46.076" v="1021" actId="13926"/>
+        <pc:sldMkLst>
+          <pc:docMk/>
+          <pc:sldMk cId="1644258017" sldId="323"/>
+        </pc:sldMkLst>
+        <pc:spChg chg="mod">
+          <ac:chgData name="Wojciech Kozlowski" userId="5f20cc3a-e355-4c31-b6ab-af4bc39239c6" providerId="ADAL" clId="{0F3C8317-08A6-4D52-AE85-974ACF5C86AA}" dt="2023-09-17T16:49:59.143" v="730"/>
+          <ac:spMkLst>
+            <pc:docMk/>
+            <pc:sldMk cId="1644258017" sldId="323"/>
+            <ac:spMk id="2" creationId="{6CC7D69F-AD27-DA32-1968-9E9C55B36E03}"/>
+          </ac:spMkLst>
+        </pc:spChg>
+        <pc:spChg chg="mod">
+          <ac:chgData name="Wojciech Kozlowski" userId="5f20cc3a-e355-4c31-b6ab-af4bc39239c6" providerId="ADAL" clId="{0F3C8317-08A6-4D52-AE85-974ACF5C86AA}" dt="2023-09-17T16:59:46.076" v="1021" actId="13926"/>
+          <ac:spMkLst>
+            <pc:docMk/>
+            <pc:sldMk cId="1644258017" sldId="323"/>
+            <ac:spMk id="3" creationId="{903125C8-1008-DB4F-988E-FD336755B6D8}"/>
+          </ac:spMkLst>
+        </pc:spChg>
       </pc:sldChg>
       <pc:sldChg chg="del">
         <pc:chgData name="Wojciech Kozlowski" userId="5f20cc3a-e355-4c31-b6ab-af4bc39239c6" providerId="ADAL" clId="{0F3C8317-08A6-4D52-AE85-974ACF5C86AA}" dt="2023-09-04T16:05:01.300" v="0" actId="47"/>
@@ -8409,6 +8433,254 @@
           <p:cNvPr id="2" name="Title 1">
             <a:extLst>
               <a:ext uri="{FF2B5EF4-FFF2-40B4-BE49-F238E27FC236}">
+                <a16:creationId xmlns:a16="http://schemas.microsoft.com/office/drawing/2014/main" id="{6CC7D69F-AD27-DA32-1968-9E9C55B36E03}"/>
+              </a:ext>
+            </a:extLst>
+          </p:cNvPr>
+          <p:cNvSpPr>
+            <a:spLocks noGrp="1"/>
+          </p:cNvSpPr>
+          <p:nvPr>
+            <p:ph type="title"/>
+          </p:nvPr>
+        </p:nvSpPr>
+        <p:spPr/>
+        <p:txBody>
+          <a:bodyPr/>
+          <a:lstStyle/>
+          <a:p>
+            <a:r>
+              <a:rPr lang="en-GB" dirty="0" err="1"/>
+              <a:t>NetSquid</a:t>
+            </a:r>
+            <a:r>
+              <a:rPr lang="en-GB" dirty="0"/>
+              <a:t> Exercises</a:t>
+            </a:r>
+          </a:p>
+        </p:txBody>
+      </p:sp>
+      <p:sp>
+        <p:nvSpPr>
+          <p:cNvPr id="3" name="Content Placeholder 2">
+            <a:extLst>
+              <a:ext uri="{FF2B5EF4-FFF2-40B4-BE49-F238E27FC236}">
+                <a16:creationId xmlns:a16="http://schemas.microsoft.com/office/drawing/2014/main" id="{903125C8-1008-DB4F-988E-FD336755B6D8}"/>
+              </a:ext>
+            </a:extLst>
+          </p:cNvPr>
+          <p:cNvSpPr>
+            <a:spLocks noGrp="1"/>
+          </p:cNvSpPr>
+          <p:nvPr>
+            <p:ph idx="1"/>
+          </p:nvPr>
+        </p:nvSpPr>
+        <p:spPr>
+          <a:xfrm>
+            <a:off x="432000" y="1476000"/>
+            <a:ext cx="6403620" cy="2880000"/>
+          </a:xfrm>
+        </p:spPr>
+        <p:txBody>
+          <a:bodyPr/>
+          <a:lstStyle/>
+          <a:p>
+            <a:r>
+              <a:rPr lang="en-GB" dirty="0"/>
+              <a:t>Clone the repository:</a:t>
+            </a:r>
+          </a:p>
+          <a:p>
+            <a:pPr marL="288000" lvl="2" indent="0">
+              <a:buNone/>
+            </a:pPr>
+            <a:r>
+              <a:rPr lang="en-GB" dirty="0"/>
+              <a:t>git clone </a:t>
+            </a:r>
+            <a:r>
+              <a:rPr lang="en-GB" dirty="0">
+                <a:hlinkClick r:id="rId2"/>
+              </a:rPr>
+              <a:t>https://github.com/QuTech-Delft/qce23-hardware-architecture-for-quantum-networks.git</a:t>
+            </a:r>
+            <a:endParaRPr lang="en-GB" dirty="0"/>
+          </a:p>
+          <a:p>
+            <a:endParaRPr lang="en-GB" dirty="0"/>
+          </a:p>
+          <a:p>
+            <a:r>
+              <a:rPr lang="en-GB" dirty="0"/>
+              <a:t>Install the pre-requisites with:</a:t>
+            </a:r>
+          </a:p>
+          <a:p>
+            <a:pPr marL="288000" lvl="2" indent="0">
+              <a:buNone/>
+            </a:pPr>
+            <a:r>
+              <a:rPr lang="en-US" dirty="0"/>
+              <a:t>python3 -m pip install --extra-index-</a:t>
+            </a:r>
+            <a:r>
+              <a:rPr lang="en-US" dirty="0" err="1"/>
+              <a:t>url</a:t>
+            </a:r>
+            <a:r>
+              <a:rPr lang="en-US" dirty="0"/>
+              <a:t> https://pypi.netsquid.org -r requirements.txt</a:t>
+            </a:r>
+            <a:endParaRPr lang="en-GB" dirty="0"/>
+          </a:p>
+          <a:p>
+            <a:pPr marL="288000" lvl="2" indent="0">
+              <a:buNone/>
+            </a:pPr>
+            <a:endParaRPr lang="en-GB" dirty="0"/>
+          </a:p>
+          <a:p>
+            <a:r>
+              <a:rPr lang="en-GB" dirty="0"/>
+              <a:t>Go into the `</a:t>
+            </a:r>
+            <a:r>
+              <a:rPr lang="en-GB" dirty="0" err="1"/>
+              <a:t>src</a:t>
+            </a:r>
+            <a:r>
+              <a:rPr lang="en-GB" dirty="0"/>
+              <a:t>` directory</a:t>
+            </a:r>
+          </a:p>
+          <a:p>
+            <a:pPr marL="288000" lvl="2" indent="0">
+              <a:buNone/>
+            </a:pPr>
+            <a:r>
+              <a:rPr lang="en-GB" dirty="0"/>
+              <a:t>cd </a:t>
+            </a:r>
+            <a:r>
+              <a:rPr lang="en-GB" dirty="0" err="1"/>
+              <a:t>src</a:t>
+            </a:r>
+            <a:endParaRPr lang="en-GB" dirty="0"/>
+          </a:p>
+          <a:p>
+            <a:endParaRPr lang="en-GB" dirty="0"/>
+          </a:p>
+          <a:p>
+            <a:r>
+              <a:rPr lang="en-GB" dirty="0"/>
+              <a:t>Run exercise N (1, 2, or 3) with:</a:t>
+            </a:r>
+          </a:p>
+          <a:p>
+            <a:pPr marL="288000" lvl="2" indent="0">
+              <a:buNone/>
+            </a:pPr>
+            <a:r>
+              <a:rPr lang="en-GB" dirty="0"/>
+              <a:t>python3 hw-arch-tutorial.py N</a:t>
+            </a:r>
+          </a:p>
+        </p:txBody>
+      </p:sp>
+      <p:sp>
+        <p:nvSpPr>
+          <p:cNvPr id="4" name="Date Placeholder 3">
+            <a:extLst>
+              <a:ext uri="{FF2B5EF4-FFF2-40B4-BE49-F238E27FC236}">
+                <a16:creationId xmlns:a16="http://schemas.microsoft.com/office/drawing/2014/main" id="{C40AFA34-14E1-FF5E-8F6B-FB5D9173E5B3}"/>
+              </a:ext>
+            </a:extLst>
+          </p:cNvPr>
+          <p:cNvSpPr>
+            <a:spLocks noGrp="1"/>
+          </p:cNvSpPr>
+          <p:nvPr>
+            <p:ph type="dt" sz="half" idx="10"/>
+          </p:nvPr>
+        </p:nvSpPr>
+        <p:spPr/>
+        <p:txBody>
+          <a:bodyPr/>
+          <a:lstStyle/>
+          <a:p>
+            <a:r>
+              <a:rPr lang="en-US"/>
+              <a:t>17 September 2023</a:t>
+            </a:r>
+            <a:endParaRPr lang="en-GB"/>
+          </a:p>
+        </p:txBody>
+      </p:sp>
+      <p:sp>
+        <p:nvSpPr>
+          <p:cNvPr id="5" name="Footer Placeholder 4">
+            <a:extLst>
+              <a:ext uri="{FF2B5EF4-FFF2-40B4-BE49-F238E27FC236}">
+                <a16:creationId xmlns:a16="http://schemas.microsoft.com/office/drawing/2014/main" id="{64EAA04D-0E80-936B-AE93-CEF2A5FFEFBC}"/>
+              </a:ext>
+            </a:extLst>
+          </p:cNvPr>
+          <p:cNvSpPr>
+            <a:spLocks noGrp="1"/>
+          </p:cNvSpPr>
+          <p:nvPr>
+            <p:ph type="ftr" sz="quarter" idx="11"/>
+          </p:nvPr>
+        </p:nvSpPr>
+        <p:spPr/>
+        <p:txBody>
+          <a:bodyPr/>
+          <a:lstStyle/>
+          <a:p>
+            <a:r>
+              <a:rPr lang="en-US"/>
+              <a:t>Heralded Entanglement Generation</a:t>
+            </a:r>
+            <a:endParaRPr lang="en-GB"/>
+          </a:p>
+        </p:txBody>
+      </p:sp>
+    </p:spTree>
+    <p:extLst>
+      <p:ext uri="{BB962C8B-B14F-4D97-AF65-F5344CB8AC3E}">
+        <p14:creationId xmlns:p14="http://schemas.microsoft.com/office/powerpoint/2010/main" val="1644258017"/>
+      </p:ext>
+    </p:extLst>
+  </p:cSld>
+  <p:clrMapOvr>
+    <a:masterClrMapping/>
+  </p:clrMapOvr>
+</p:sld>
+</file>
+
+<file path=ppt/slides/slide4.xml><?xml version="1.0" encoding="utf-8"?>
+<p:sld xmlns:a="http://schemas.openxmlformats.org/drawingml/2006/main" xmlns:r="http://schemas.openxmlformats.org/officeDocument/2006/relationships" xmlns:p="http://schemas.openxmlformats.org/presentationml/2006/main">
+  <p:cSld>
+    <p:spTree>
+      <p:nvGrpSpPr>
+        <p:cNvPr id="1" name=""/>
+        <p:cNvGrpSpPr/>
+        <p:nvPr/>
+      </p:nvGrpSpPr>
+      <p:grpSpPr>
+        <a:xfrm>
+          <a:off x="0" y="0"/>
+          <a:ext cx="0" cy="0"/>
+          <a:chOff x="0" y="0"/>
+          <a:chExt cx="0" cy="0"/>
+        </a:xfrm>
+      </p:grpSpPr>
+      <p:sp>
+        <p:nvSpPr>
+          <p:cNvPr id="2" name="Title 1">
+            <a:extLst>
+              <a:ext uri="{FF2B5EF4-FFF2-40B4-BE49-F238E27FC236}">
                 <a16:creationId xmlns:a16="http://schemas.microsoft.com/office/drawing/2014/main" id="{BD09C2EC-7852-DBEF-74DD-FF37B888C71E}"/>
               </a:ext>
             </a:extLst>
@@ -8636,7 +8908,7 @@
 </p:sld>
 </file>
 
-<file path=ppt/slides/slide4.xml><?xml version="1.0" encoding="utf-8"?>
+<file path=ppt/slides/slide5.xml><?xml version="1.0" encoding="utf-8"?>
 <p:sld xmlns:a="http://schemas.openxmlformats.org/drawingml/2006/main" xmlns:r="http://schemas.openxmlformats.org/officeDocument/2006/relationships" xmlns:p="http://schemas.openxmlformats.org/presentationml/2006/main">
   <p:cSld>
     <p:spTree>
@@ -9181,7 +9453,7 @@
 </p:sld>
 </file>
 
-<file path=ppt/slides/slide5.xml><?xml version="1.0" encoding="utf-8"?>
+<file path=ppt/slides/slide6.xml><?xml version="1.0" encoding="utf-8"?>
 <p:sld xmlns:a="http://schemas.openxmlformats.org/drawingml/2006/main" xmlns:r="http://schemas.openxmlformats.org/officeDocument/2006/relationships" xmlns:p="http://schemas.openxmlformats.org/presentationml/2006/main">
   <p:cSld>
     <p:spTree>
@@ -10038,7 +10310,7 @@
 </p:sld>
 </file>
 
-<file path=ppt/slides/slide6.xml><?xml version="1.0" encoding="utf-8"?>
+<file path=ppt/slides/slide7.xml><?xml version="1.0" encoding="utf-8"?>
 <p:sld xmlns:a="http://schemas.openxmlformats.org/drawingml/2006/main" xmlns:r="http://schemas.openxmlformats.org/officeDocument/2006/relationships" xmlns:p="http://schemas.openxmlformats.org/presentationml/2006/main">
   <p:cSld>
     <p:spTree>
@@ -11258,18 +11530,18 @@
 </file>
 
 <file path=customXml/item1.xml><?xml version="1.0" encoding="utf-8"?>
+<p:properties xmlns:p="http://schemas.microsoft.com/office/2006/metadata/properties" xmlns:xsi="http://www.w3.org/2001/XMLSchema-instance" xmlns:pc="http://schemas.microsoft.com/office/infopath/2007/PartnerControls">
+  <documentManagement/>
+</p:properties>
+</file>
+
+<file path=customXml/item2.xml><?xml version="1.0" encoding="utf-8"?>
 <?mso-contentType ?>
 <FormTemplates xmlns="http://schemas.microsoft.com/sharepoint/v3/contenttype/forms">
   <Display>DocumentLibraryForm</Display>
   <Edit>DocumentLibraryForm</Edit>
   <New>DocumentLibraryForm</New>
 </FormTemplates>
-</file>
-
-<file path=customXml/item2.xml><?xml version="1.0" encoding="utf-8"?>
-<p:properties xmlns:p="http://schemas.microsoft.com/office/2006/metadata/properties" xmlns:xsi="http://www.w3.org/2001/XMLSchema-instance" xmlns:pc="http://schemas.microsoft.com/office/infopath/2007/PartnerControls">
-  <documentManagement/>
-</p:properties>
 </file>
 
 <file path=customXml/item3.xml><?xml version="1.0" encoding="utf-8"?>
@@ -11411,14 +11683,6 @@
 </file>
 
 <file path=customXml/itemProps1.xml><?xml version="1.0" encoding="utf-8"?>
-<ds:datastoreItem xmlns:ds="http://schemas.openxmlformats.org/officeDocument/2006/customXml" ds:itemID="{F2D99A9A-8EF4-4E65-8D43-BD35B797CB8F}">
-  <ds:schemaRefs>
-    <ds:schemaRef ds:uri="http://schemas.microsoft.com/sharepoint/v3/contenttype/forms"/>
-  </ds:schemaRefs>
-</ds:datastoreItem>
-</file>
-
-<file path=customXml/itemProps2.xml><?xml version="1.0" encoding="utf-8"?>
 <ds:datastoreItem xmlns:ds="http://schemas.openxmlformats.org/officeDocument/2006/customXml" ds:itemID="{2C278F92-B28D-4203-8E3F-577FF3DAD933}">
   <ds:schemaRefs>
     <ds:schemaRef ds:uri="http://schemas.openxmlformats.org/package/2006/metadata/core-properties"/>
@@ -11431,6 +11695,14 @@
     <ds:schemaRef ds:uri="http://schemas.microsoft.com/office/2006/documentManagement/types"/>
     <ds:schemaRef ds:uri="http://purl.org/dc/terms/"/>
     <ds:schemaRef ds:uri="http://www.w3.org/XML/1998/namespace"/>
+  </ds:schemaRefs>
+</ds:datastoreItem>
+</file>
+
+<file path=customXml/itemProps2.xml><?xml version="1.0" encoding="utf-8"?>
+<ds:datastoreItem xmlns:ds="http://schemas.openxmlformats.org/officeDocument/2006/customXml" ds:itemID="{F2D99A9A-8EF4-4E65-8D43-BD35B797CB8F}">
+  <ds:schemaRefs>
+    <ds:schemaRef ds:uri="http://schemas.microsoft.com/sharepoint/v3/contenttype/forms"/>
   </ds:schemaRefs>
 </ds:datastoreItem>
 </file>

</xml_diff>